<commit_message>
add 11,12,13 mutmap fig
</commit_message>
<xml_diff>
--- a/FAO_2024/mutmapqtlseq.pptx
+++ b/FAO_2024/mutmapqtlseq.pptx
@@ -8945,10 +8945,10 @@
       </p:grpSpPr>
       <p:pic>
         <p:nvPicPr>
-          <p:cNvPr id="51" name="図 50" descr="背景パターン が含まれている画像&#10;&#10;自動的に生成された説明">
-            <a:extLst>
-              <a:ext uri="{FF2B5EF4-FFF2-40B4-BE49-F238E27FC236}">
-                <a16:creationId xmlns:a16="http://schemas.microsoft.com/office/drawing/2014/main" id="{E00D12F9-B696-3A46-6BE5-34EE139F7930}"/>
+          <p:cNvPr id="3" name="図 2" descr="テーブル&#10;&#10;自動的に生成された説明">
+            <a:extLst>
+              <a:ext uri="{FF2B5EF4-FFF2-40B4-BE49-F238E27FC236}">
+                <a16:creationId xmlns:a16="http://schemas.microsoft.com/office/drawing/2014/main" id="{79E17693-8B3C-2F6B-874E-B8F7DB9D40D7}"/>
               </a:ext>
             </a:extLst>
           </p:cNvPr>
@@ -8957,8 +8957,44 @@
           </p:cNvPicPr>
           <p:nvPr/>
         </p:nvPicPr>
+        <p:blipFill>
+          <a:blip r:embed="rId2">
+            <a:extLst>
+              <a:ext uri="{28A0092B-C50C-407E-A947-70E740481C1C}">
+                <a14:useLocalDpi xmlns:a14="http://schemas.microsoft.com/office/drawing/2010/main" val="0"/>
+              </a:ext>
+            </a:extLst>
+          </a:blip>
+          <a:stretch>
+            <a:fillRect/>
+          </a:stretch>
+        </p:blipFill>
+        <p:spPr>
+          <a:xfrm>
+            <a:off x="1525352" y="850787"/>
+            <a:ext cx="571550" cy="2606266"/>
+          </a:xfrm>
+          <a:prstGeom prst="rect">
+            <a:avLst/>
+          </a:prstGeom>
+        </p:spPr>
+      </p:pic>
+      <p:pic>
+        <p:nvPicPr>
+          <p:cNvPr id="51" name="図 50" descr="背景パターン が含まれている画像&#10;&#10;自動的に生成された説明">
+            <a:extLst>
+              <a:ext uri="{FF2B5EF4-FFF2-40B4-BE49-F238E27FC236}">
+                <a16:creationId xmlns:a16="http://schemas.microsoft.com/office/drawing/2014/main" id="{E00D12F9-B696-3A46-6BE5-34EE139F7930}"/>
+              </a:ext>
+            </a:extLst>
+          </p:cNvPr>
+          <p:cNvPicPr>
+            <a:picLocks noChangeAspect="1"/>
+          </p:cNvPicPr>
+          <p:nvPr/>
+        </p:nvPicPr>
         <p:blipFill rotWithShape="1">
-          <a:blip r:embed="rId2">
+          <a:blip r:embed="rId3">
             <a:extLst>
               <a:ext uri="{28A0092B-C50C-407E-A947-70E740481C1C}">
                 <a14:useLocalDpi xmlns:a14="http://schemas.microsoft.com/office/drawing/2010/main" val="0"/>
@@ -8993,55 +9029,20 @@
           <p:nvPr/>
         </p:nvPicPr>
         <p:blipFill rotWithShape="1">
-          <a:blip r:embed="rId3">
+          <a:blip r:embed="rId4">
             <a:extLst>
               <a:ext uri="{28A0092B-C50C-407E-A947-70E740481C1C}">
                 <a14:useLocalDpi xmlns:a14="http://schemas.microsoft.com/office/drawing/2010/main" val="0"/>
               </a:ext>
             </a:extLst>
           </a:blip>
-          <a:srcRect t="7637"/>
+          <a:srcRect l="14598" t="7637" r="13640"/>
           <a:stretch/>
         </p:blipFill>
         <p:spPr>
           <a:xfrm>
-            <a:off x="2403368" y="876300"/>
-            <a:ext cx="784928" cy="2688784"/>
-          </a:xfrm>
-          <a:prstGeom prst="rect">
-            <a:avLst/>
-          </a:prstGeom>
-        </p:spPr>
-      </p:pic>
-      <p:pic>
-        <p:nvPicPr>
-          <p:cNvPr id="66" name="図 65" descr="グラフ が含まれている画像&#10;&#10;自動的に生成された説明">
-            <a:extLst>
-              <a:ext uri="{FF2B5EF4-FFF2-40B4-BE49-F238E27FC236}">
-                <a16:creationId xmlns:a16="http://schemas.microsoft.com/office/drawing/2014/main" id="{115E9209-189B-70A4-8F74-341F34AAEC07}"/>
-              </a:ext>
-            </a:extLst>
-          </p:cNvPr>
-          <p:cNvPicPr>
-            <a:picLocks noChangeAspect="1"/>
-          </p:cNvPicPr>
-          <p:nvPr/>
-        </p:nvPicPr>
-        <p:blipFill rotWithShape="1">
-          <a:blip r:embed="rId4">
-            <a:extLst>
-              <a:ext uri="{28A0092B-C50C-407E-A947-70E740481C1C}">
-                <a14:useLocalDpi xmlns:a14="http://schemas.microsoft.com/office/drawing/2010/main" val="0"/>
-              </a:ext>
-            </a:extLst>
-          </a:blip>
-          <a:srcRect t="12641"/>
-          <a:stretch/>
-        </p:blipFill>
-        <p:spPr>
-          <a:xfrm>
-            <a:off x="1461414" y="876300"/>
-            <a:ext cx="586791" cy="1983883"/>
+            <a:off x="2517947" y="876300"/>
+            <a:ext cx="563287" cy="2688784"/>
           </a:xfrm>
           <a:prstGeom prst="rect">
             <a:avLst/>
@@ -9162,8 +9163,8 @@
         </p:nvSpPr>
         <p:spPr>
           <a:xfrm>
-            <a:off x="1663369" y="1557752"/>
-            <a:ext cx="182880" cy="1314000"/>
+            <a:off x="1720519" y="1557751"/>
+            <a:ext cx="182880" cy="1899301"/>
           </a:xfrm>
           <a:prstGeom prst="rect">
             <a:avLst/>
@@ -9228,6 +9229,7 @@
               </a:bodyPr>
               <a:lstStyle/>
               <a:p>
+                <a:pPr/>
                 <a14:m>
                   <m:oMathPara xmlns:m="http://schemas.openxmlformats.org/officeDocument/2006/math">
                     <m:oMathParaPr>
@@ -9374,7 +9376,7 @@
         </p:nvSpPr>
         <p:spPr>
           <a:xfrm>
-            <a:off x="945061" y="1878914"/>
+            <a:off x="976811" y="1878914"/>
             <a:ext cx="665849" cy="400110"/>
           </a:xfrm>
           <a:prstGeom prst="rect">
@@ -9411,7 +9413,7 @@
         </p:nvSpPr>
         <p:spPr>
           <a:xfrm>
-            <a:off x="1892862" y="1882088"/>
+            <a:off x="1969062" y="1882088"/>
             <a:ext cx="665849" cy="400110"/>
           </a:xfrm>
           <a:prstGeom prst="rect">
@@ -9537,7 +9539,7 @@
         </p:nvSpPr>
         <p:spPr>
           <a:xfrm>
-            <a:off x="1461225" y="657466"/>
+            <a:off x="1518375" y="657466"/>
             <a:ext cx="586790" cy="276999"/>
           </a:xfrm>
           <a:prstGeom prst="rect">
@@ -9649,7 +9651,7 @@
           <p:nvPr>
             <p:extLst>
               <p:ext uri="{D42A27DB-BD31-4B8C-83A1-F6EECF244321}">
-                <p14:modId xmlns:p14="http://schemas.microsoft.com/office/powerpoint/2010/main" val="1258314021"/>
+                <p14:modId xmlns:p14="http://schemas.microsoft.com/office/powerpoint/2010/main" val="2937788283"/>
               </p:ext>
             </p:extLst>
           </p:nvPr>
@@ -9997,7 +9999,7 @@
                       <a:pPr algn="ctr"/>
                       <a:r>
                         <a:rPr kumimoji="1" lang="en-US" altLang="ja-JP" sz="1100" dirty="0"/>
-                        <a:t>10</a:t>
+                        <a:t>15</a:t>
                       </a:r>
                       <a:endParaRPr kumimoji="1" lang="ja-JP" altLang="en-US" sz="1100" dirty="0"/>
                     </a:p>
@@ -10031,7 +10033,7 @@
                       <a:pPr algn="ctr"/>
                       <a:r>
                         <a:rPr kumimoji="1" lang="en-US" altLang="ja-JP" sz="1100" dirty="0"/>
-                        <a:t>10</a:t>
+                        <a:t>15</a:t>
                       </a:r>
                       <a:endParaRPr kumimoji="1" lang="ja-JP" altLang="en-US" sz="1100" dirty="0"/>
                     </a:p>
@@ -10216,6 +10218,588 @@
           </a:graphicData>
         </a:graphic>
       </p:graphicFrame>
+      <p:pic>
+        <p:nvPicPr>
+          <p:cNvPr id="1028" name="Picture 4">
+            <a:extLst>
+              <a:ext uri="{FF2B5EF4-FFF2-40B4-BE49-F238E27FC236}">
+                <a16:creationId xmlns:a16="http://schemas.microsoft.com/office/drawing/2014/main" id="{BBB32779-4E78-E415-306F-2F6329AE6E31}"/>
+              </a:ext>
+            </a:extLst>
+          </p:cNvPr>
+          <p:cNvPicPr>
+            <a:picLocks noChangeAspect="1" noChangeArrowheads="1"/>
+          </p:cNvPicPr>
+          <p:nvPr/>
+        </p:nvPicPr>
+        <p:blipFill>
+          <a:blip r:embed="rId6">
+            <a:extLst>
+              <a:ext uri="{28A0092B-C50C-407E-A947-70E740481C1C}">
+                <a14:useLocalDpi xmlns:a14="http://schemas.microsoft.com/office/drawing/2010/main" val="0"/>
+              </a:ext>
+            </a:extLst>
+          </a:blip>
+          <a:srcRect/>
+          <a:stretch>
+            <a:fillRect/>
+          </a:stretch>
+        </p:blipFill>
+        <p:spPr bwMode="auto">
+          <a:xfrm>
+            <a:off x="0" y="5318088"/>
+            <a:ext cx="4845036" cy="1909165"/>
+          </a:xfrm>
+          <a:prstGeom prst="rect">
+            <a:avLst/>
+          </a:prstGeom>
+          <a:noFill/>
+          <a:extLst>
+            <a:ext uri="{909E8E84-426E-40DD-AFC4-6F175D3DCCD1}">
+              <a14:hiddenFill xmlns:a14="http://schemas.microsoft.com/office/drawing/2010/main">
+                <a:solidFill>
+                  <a:srgbClr val="FFFFFF"/>
+                </a:solidFill>
+              </a14:hiddenFill>
+            </a:ext>
+          </a:extLst>
+        </p:spPr>
+      </p:pic>
+      <p:pic>
+        <p:nvPicPr>
+          <p:cNvPr id="5" name="図 4" descr="グラフ&#10;&#10;低い精度で自動的に生成された説明">
+            <a:extLst>
+              <a:ext uri="{FF2B5EF4-FFF2-40B4-BE49-F238E27FC236}">
+                <a16:creationId xmlns:a16="http://schemas.microsoft.com/office/drawing/2014/main" id="{F72BBFCF-49A2-F93F-420B-B560988328AC}"/>
+              </a:ext>
+            </a:extLst>
+          </p:cNvPr>
+          <p:cNvPicPr>
+            <a:picLocks noChangeAspect="1"/>
+          </p:cNvPicPr>
+          <p:nvPr/>
+        </p:nvPicPr>
+        <p:blipFill>
+          <a:blip r:embed="rId7">
+            <a:extLst>
+              <a:ext uri="{28A0092B-C50C-407E-A947-70E740481C1C}">
+                <a14:useLocalDpi xmlns:a14="http://schemas.microsoft.com/office/drawing/2010/main" val="0"/>
+              </a:ext>
+            </a:extLst>
+          </a:blip>
+          <a:stretch>
+            <a:fillRect/>
+          </a:stretch>
+        </p:blipFill>
+        <p:spPr>
+          <a:xfrm>
+            <a:off x="5288309" y="4794250"/>
+            <a:ext cx="975445" cy="2248095"/>
+          </a:xfrm>
+          <a:prstGeom prst="rect">
+            <a:avLst/>
+          </a:prstGeom>
+        </p:spPr>
+      </p:pic>
+      <p:sp>
+        <p:nvSpPr>
+          <p:cNvPr id="6" name="正方形/長方形 5">
+            <a:extLst>
+              <a:ext uri="{FF2B5EF4-FFF2-40B4-BE49-F238E27FC236}">
+                <a16:creationId xmlns:a16="http://schemas.microsoft.com/office/drawing/2014/main" id="{1A912D9F-236D-3B73-EF47-892440D6D4E2}"/>
+              </a:ext>
+            </a:extLst>
+          </p:cNvPr>
+          <p:cNvSpPr/>
+          <p:nvPr/>
+        </p:nvSpPr>
+        <p:spPr>
+          <a:xfrm>
+            <a:off x="2289286" y="5368985"/>
+            <a:ext cx="192975" cy="1352550"/>
+          </a:xfrm>
+          <a:prstGeom prst="rect">
+            <a:avLst/>
+          </a:prstGeom>
+          <a:solidFill>
+            <a:srgbClr val="ED7D31">
+              <a:alpha val="30196"/>
+            </a:srgbClr>
+          </a:solidFill>
+          <a:ln>
+            <a:noFill/>
+          </a:ln>
+        </p:spPr>
+        <p:style>
+          <a:lnRef idx="2">
+            <a:schemeClr val="accent1">
+              <a:shade val="15000"/>
+            </a:schemeClr>
+          </a:lnRef>
+          <a:fillRef idx="1">
+            <a:schemeClr val="accent1"/>
+          </a:fillRef>
+          <a:effectRef idx="0">
+            <a:schemeClr val="accent1"/>
+          </a:effectRef>
+          <a:fontRef idx="minor">
+            <a:schemeClr val="lt1"/>
+          </a:fontRef>
+        </p:style>
+        <p:txBody>
+          <a:bodyPr rtlCol="0" anchor="ctr"/>
+          <a:lstStyle/>
+          <a:p>
+            <a:pPr algn="ctr"/>
+            <a:endParaRPr kumimoji="1" lang="ja-JP" altLang="en-US"/>
+          </a:p>
+        </p:txBody>
+      </p:sp>
+      <p:sp>
+        <p:nvSpPr>
+          <p:cNvPr id="7" name="フリーフォーム: 図形 6">
+            <a:extLst>
+              <a:ext uri="{FF2B5EF4-FFF2-40B4-BE49-F238E27FC236}">
+                <a16:creationId xmlns:a16="http://schemas.microsoft.com/office/drawing/2014/main" id="{3F766518-D621-60D2-B425-A0814EA0DF63}"/>
+              </a:ext>
+            </a:extLst>
+          </p:cNvPr>
+          <p:cNvSpPr/>
+          <p:nvPr/>
+        </p:nvSpPr>
+        <p:spPr>
+          <a:xfrm>
+            <a:off x="2482260" y="4527054"/>
+            <a:ext cx="3004139" cy="506381"/>
+          </a:xfrm>
+          <a:custGeom>
+            <a:avLst/>
+            <a:gdLst>
+              <a:gd name="connsiteX0" fmla="*/ 0 w 3124200"/>
+              <a:gd name="connsiteY0" fmla="*/ 819646 h 819646"/>
+              <a:gd name="connsiteX1" fmla="*/ 1530350 w 3124200"/>
+              <a:gd name="connsiteY1" fmla="*/ 19546 h 819646"/>
+              <a:gd name="connsiteX2" fmla="*/ 3124200 w 3124200"/>
+              <a:gd name="connsiteY2" fmla="*/ 324346 h 819646"/>
+            </a:gdLst>
+            <a:ahLst/>
+            <a:cxnLst>
+              <a:cxn ang="0">
+                <a:pos x="connsiteX0" y="connsiteY0"/>
+              </a:cxn>
+              <a:cxn ang="0">
+                <a:pos x="connsiteX1" y="connsiteY1"/>
+              </a:cxn>
+              <a:cxn ang="0">
+                <a:pos x="connsiteX2" y="connsiteY2"/>
+              </a:cxn>
+            </a:cxnLst>
+            <a:rect l="l" t="t" r="r" b="b"/>
+            <a:pathLst>
+              <a:path w="3124200" h="819646">
+                <a:moveTo>
+                  <a:pt x="0" y="819646"/>
+                </a:moveTo>
+                <a:cubicBezTo>
+                  <a:pt x="504825" y="460871"/>
+                  <a:pt x="1009650" y="102096"/>
+                  <a:pt x="1530350" y="19546"/>
+                </a:cubicBezTo>
+                <a:cubicBezTo>
+                  <a:pt x="2051050" y="-63004"/>
+                  <a:pt x="2587625" y="130671"/>
+                  <a:pt x="3124200" y="324346"/>
+                </a:cubicBezTo>
+              </a:path>
+            </a:pathLst>
+          </a:custGeom>
+          <a:noFill/>
+          <a:ln w="19050">
+            <a:headEnd type="triangle" w="med" len="med"/>
+            <a:tailEnd type="triangle" w="med" len="med"/>
+          </a:ln>
+        </p:spPr>
+        <p:style>
+          <a:lnRef idx="2">
+            <a:schemeClr val="accent1">
+              <a:shade val="15000"/>
+            </a:schemeClr>
+          </a:lnRef>
+          <a:fillRef idx="1">
+            <a:schemeClr val="accent1"/>
+          </a:fillRef>
+          <a:effectRef idx="0">
+            <a:schemeClr val="accent1"/>
+          </a:effectRef>
+          <a:fontRef idx="minor">
+            <a:schemeClr val="lt1"/>
+          </a:fontRef>
+        </p:style>
+        <p:txBody>
+          <a:bodyPr rtlCol="0" anchor="ctr"/>
+          <a:lstStyle/>
+          <a:p>
+            <a:pPr algn="ctr"/>
+            <a:endParaRPr kumimoji="1" lang="ja-JP" altLang="en-US"/>
+          </a:p>
+        </p:txBody>
+      </p:sp>
+      <p:sp>
+        <p:nvSpPr>
+          <p:cNvPr id="8" name="テキスト ボックス 7">
+            <a:extLst>
+              <a:ext uri="{FF2B5EF4-FFF2-40B4-BE49-F238E27FC236}">
+                <a16:creationId xmlns:a16="http://schemas.microsoft.com/office/drawing/2014/main" id="{A9B90A09-37DE-7EF8-35A6-EFE41E9FCED4}"/>
+              </a:ext>
+            </a:extLst>
+          </p:cNvPr>
+          <p:cNvSpPr txBox="1"/>
+          <p:nvPr/>
+        </p:nvSpPr>
+        <p:spPr>
+          <a:xfrm>
+            <a:off x="1518375" y="5033435"/>
+            <a:ext cx="1820055" cy="338554"/>
+          </a:xfrm>
+          <a:prstGeom prst="rect">
+            <a:avLst/>
+          </a:prstGeom>
+          <a:noFill/>
+        </p:spPr>
+        <p:txBody>
+          <a:bodyPr wrap="square" rtlCol="0">
+            <a:spAutoFit/>
+          </a:bodyPr>
+          <a:lstStyle/>
+          <a:p>
+            <a:pPr algn="ctr"/>
+            <a:r>
+              <a:rPr kumimoji="1" lang="en-US" altLang="ja-JP" sz="1600" dirty="0"/>
+              <a:t>Causal mutation!</a:t>
+            </a:r>
+            <a:endParaRPr kumimoji="1" lang="ja-JP" altLang="en-US" sz="1600" dirty="0"/>
+          </a:p>
+        </p:txBody>
+      </p:sp>
+      <p:pic>
+        <p:nvPicPr>
+          <p:cNvPr id="9" name="グラフィックス 8" descr="植物 単色塗りつぶし">
+            <a:extLst>
+              <a:ext uri="{FF2B5EF4-FFF2-40B4-BE49-F238E27FC236}">
+                <a16:creationId xmlns:a16="http://schemas.microsoft.com/office/drawing/2014/main" id="{B6B91BCB-7322-9ACA-4774-456FA05E716B}"/>
+              </a:ext>
+            </a:extLst>
+          </p:cNvPr>
+          <p:cNvPicPr>
+            <a:picLocks noChangeAspect="1"/>
+          </p:cNvPicPr>
+          <p:nvPr/>
+        </p:nvPicPr>
+        <p:blipFill>
+          <a:blip r:embed="rId8">
+            <a:extLst>
+              <a:ext uri="{28A0092B-C50C-407E-A947-70E740481C1C}">
+                <a14:useLocalDpi xmlns:a14="http://schemas.microsoft.com/office/drawing/2010/main" val="0"/>
+              </a:ext>
+              <a:ext uri="{96DAC541-7B7A-43D3-8B79-37D633B846F1}">
+                <asvg:svgBlip xmlns:asvg="http://schemas.microsoft.com/office/drawing/2016/SVG/main" r:embed="rId9"/>
+              </a:ext>
+            </a:extLst>
+          </a:blip>
+          <a:stretch>
+            <a:fillRect/>
+          </a:stretch>
+        </p:blipFill>
+        <p:spPr>
+          <a:xfrm>
+            <a:off x="1374886" y="7713553"/>
+            <a:ext cx="914400" cy="914400"/>
+          </a:xfrm>
+          <a:prstGeom prst="rect">
+            <a:avLst/>
+          </a:prstGeom>
+        </p:spPr>
+      </p:pic>
+      <p:pic>
+        <p:nvPicPr>
+          <p:cNvPr id="10" name="グラフィックス 9" descr="植物 単色塗りつぶし">
+            <a:extLst>
+              <a:ext uri="{FF2B5EF4-FFF2-40B4-BE49-F238E27FC236}">
+                <a16:creationId xmlns:a16="http://schemas.microsoft.com/office/drawing/2014/main" id="{2ACC60B7-2309-9D98-587E-75C5AF0EA401}"/>
+              </a:ext>
+            </a:extLst>
+          </p:cNvPr>
+          <p:cNvPicPr>
+            <a:picLocks noChangeAspect="1"/>
+          </p:cNvPicPr>
+          <p:nvPr/>
+        </p:nvPicPr>
+        <p:blipFill>
+          <a:blip r:embed="rId10">
+            <a:extLst>
+              <a:ext uri="{28A0092B-C50C-407E-A947-70E740481C1C}">
+                <a14:useLocalDpi xmlns:a14="http://schemas.microsoft.com/office/drawing/2010/main" val="0"/>
+              </a:ext>
+              <a:ext uri="{96DAC541-7B7A-43D3-8B79-37D633B846F1}">
+                <asvg:svgBlip xmlns:asvg="http://schemas.microsoft.com/office/drawing/2016/SVG/main" r:embed="rId11"/>
+              </a:ext>
+            </a:extLst>
+          </a:blip>
+          <a:stretch>
+            <a:fillRect/>
+          </a:stretch>
+        </p:blipFill>
+        <p:spPr>
+          <a:xfrm>
+            <a:off x="1374886" y="8850973"/>
+            <a:ext cx="914400" cy="914400"/>
+          </a:xfrm>
+          <a:prstGeom prst="rect">
+            <a:avLst/>
+          </a:prstGeom>
+        </p:spPr>
+      </p:pic>
+      <p:sp>
+        <p:nvSpPr>
+          <p:cNvPr id="11" name="テキスト ボックス 10">
+            <a:extLst>
+              <a:ext uri="{FF2B5EF4-FFF2-40B4-BE49-F238E27FC236}">
+                <a16:creationId xmlns:a16="http://schemas.microsoft.com/office/drawing/2014/main" id="{6466EAF4-4F32-95F3-D28D-FE3C951EF317}"/>
+              </a:ext>
+            </a:extLst>
+          </p:cNvPr>
+          <p:cNvSpPr txBox="1"/>
+          <p:nvPr/>
+        </p:nvSpPr>
+        <p:spPr>
+          <a:xfrm>
+            <a:off x="2050737" y="8057137"/>
+            <a:ext cx="1293750" cy="369332"/>
+          </a:xfrm>
+          <a:prstGeom prst="rect">
+            <a:avLst/>
+          </a:prstGeom>
+          <a:noFill/>
+        </p:spPr>
+        <p:txBody>
+          <a:bodyPr wrap="square" rtlCol="0">
+            <a:spAutoFit/>
+          </a:bodyPr>
+          <a:lstStyle/>
+          <a:p>
+            <a:pPr algn="ctr"/>
+            <a:r>
+              <a:rPr kumimoji="1" lang="en-US" altLang="ja-JP" b="1" dirty="0">
+                <a:solidFill>
+                  <a:schemeClr val="accent6"/>
+                </a:solidFill>
+              </a:rPr>
+              <a:t>Green leaf</a:t>
+            </a:r>
+            <a:endParaRPr kumimoji="1" lang="ja-JP" altLang="en-US" b="1" dirty="0">
+              <a:solidFill>
+                <a:schemeClr val="accent6"/>
+              </a:solidFill>
+            </a:endParaRPr>
+          </a:p>
+        </p:txBody>
+      </p:sp>
+      <p:sp>
+        <p:nvSpPr>
+          <p:cNvPr id="12" name="テキスト ボックス 11">
+            <a:extLst>
+              <a:ext uri="{FF2B5EF4-FFF2-40B4-BE49-F238E27FC236}">
+                <a16:creationId xmlns:a16="http://schemas.microsoft.com/office/drawing/2014/main" id="{D47AF5E8-5DBE-394B-29BB-EC190EC7C6C3}"/>
+              </a:ext>
+            </a:extLst>
+          </p:cNvPr>
+          <p:cNvSpPr txBox="1"/>
+          <p:nvPr/>
+        </p:nvSpPr>
+        <p:spPr>
+          <a:xfrm>
+            <a:off x="2109094" y="9175699"/>
+            <a:ext cx="1293750" cy="369332"/>
+          </a:xfrm>
+          <a:prstGeom prst="rect">
+            <a:avLst/>
+          </a:prstGeom>
+          <a:noFill/>
+        </p:spPr>
+        <p:txBody>
+          <a:bodyPr wrap="square" rtlCol="0">
+            <a:spAutoFit/>
+          </a:bodyPr>
+          <a:lstStyle/>
+          <a:p>
+            <a:pPr algn="ctr"/>
+            <a:r>
+              <a:rPr kumimoji="1" lang="en-US" altLang="ja-JP" b="1" dirty="0"/>
+              <a:t>Black leaf</a:t>
+            </a:r>
+            <a:endParaRPr kumimoji="1" lang="ja-JP" altLang="en-US" b="1" dirty="0"/>
+          </a:p>
+        </p:txBody>
+      </p:sp>
+      <p:sp>
+        <p:nvSpPr>
+          <p:cNvPr id="13" name="吹き出し: 角を丸めた四角形 12">
+            <a:extLst>
+              <a:ext uri="{FF2B5EF4-FFF2-40B4-BE49-F238E27FC236}">
+                <a16:creationId xmlns:a16="http://schemas.microsoft.com/office/drawing/2014/main" id="{9E320782-5362-E804-BB21-F314519589DC}"/>
+              </a:ext>
+            </a:extLst>
+          </p:cNvPr>
+          <p:cNvSpPr/>
+          <p:nvPr/>
+        </p:nvSpPr>
+        <p:spPr>
+          <a:xfrm>
+            <a:off x="3428628" y="8131248"/>
+            <a:ext cx="1800000" cy="210916"/>
+          </a:xfrm>
+          <a:prstGeom prst="wedgeRoundRectCallout">
+            <a:avLst>
+              <a:gd name="adj1" fmla="val 20839"/>
+              <a:gd name="adj2" fmla="val -36952"/>
+              <a:gd name="adj3" fmla="val 16667"/>
+            </a:avLst>
+          </a:prstGeom>
+        </p:spPr>
+        <p:style>
+          <a:lnRef idx="2">
+            <a:schemeClr val="dk1">
+              <a:shade val="50000"/>
+            </a:schemeClr>
+          </a:lnRef>
+          <a:fillRef idx="1">
+            <a:schemeClr val="dk1"/>
+          </a:fillRef>
+          <a:effectRef idx="0">
+            <a:schemeClr val="dk1"/>
+          </a:effectRef>
+          <a:fontRef idx="minor">
+            <a:schemeClr val="lt1"/>
+          </a:fontRef>
+        </p:style>
+        <p:txBody>
+          <a:bodyPr rtlCol="0" anchor="ctr"/>
+          <a:lstStyle/>
+          <a:p>
+            <a:pPr algn="ctr"/>
+            <a:r>
+              <a:rPr kumimoji="1" lang="en-US" altLang="ja-JP" dirty="0"/>
+              <a:t>…TTCGAAACG…</a:t>
+            </a:r>
+            <a:endParaRPr kumimoji="1" lang="ja-JP" altLang="en-US" dirty="0"/>
+          </a:p>
+        </p:txBody>
+      </p:sp>
+      <p:cxnSp>
+        <p:nvCxnSpPr>
+          <p:cNvPr id="15" name="直線矢印コネクタ 14">
+            <a:extLst>
+              <a:ext uri="{FF2B5EF4-FFF2-40B4-BE49-F238E27FC236}">
+                <a16:creationId xmlns:a16="http://schemas.microsoft.com/office/drawing/2014/main" id="{C30289D4-E4CC-E549-8F6A-38D5B1B61AA8}"/>
+              </a:ext>
+            </a:extLst>
+          </p:cNvPr>
+          <p:cNvCxnSpPr/>
+          <p:nvPr/>
+        </p:nvCxnSpPr>
+        <p:spPr>
+          <a:xfrm>
+            <a:off x="4306047" y="8409547"/>
+            <a:ext cx="0" cy="749808"/>
+          </a:xfrm>
+          <a:prstGeom prst="straightConnector1">
+            <a:avLst/>
+          </a:prstGeom>
+          <a:ln w="38100">
+            <a:tailEnd type="triangle"/>
+          </a:ln>
+        </p:spPr>
+        <p:style>
+          <a:lnRef idx="1">
+            <a:schemeClr val="dk1"/>
+          </a:lnRef>
+          <a:fillRef idx="0">
+            <a:schemeClr val="dk1"/>
+          </a:fillRef>
+          <a:effectRef idx="0">
+            <a:schemeClr val="dk1"/>
+          </a:effectRef>
+          <a:fontRef idx="minor">
+            <a:schemeClr val="tx1"/>
+          </a:fontRef>
+        </p:style>
+      </p:cxnSp>
+      <p:sp>
+        <p:nvSpPr>
+          <p:cNvPr id="18" name="吹き出し: 角を丸めた四角形 17">
+            <a:extLst>
+              <a:ext uri="{FF2B5EF4-FFF2-40B4-BE49-F238E27FC236}">
+                <a16:creationId xmlns:a16="http://schemas.microsoft.com/office/drawing/2014/main" id="{8151630D-AB1D-CE84-6E71-0A682F716FC1}"/>
+              </a:ext>
+            </a:extLst>
+          </p:cNvPr>
+          <p:cNvSpPr/>
+          <p:nvPr/>
+        </p:nvSpPr>
+        <p:spPr>
+          <a:xfrm>
+            <a:off x="3428628" y="9241820"/>
+            <a:ext cx="1800000" cy="210916"/>
+          </a:xfrm>
+          <a:prstGeom prst="wedgeRoundRectCallout">
+            <a:avLst>
+              <a:gd name="adj1" fmla="val 20839"/>
+              <a:gd name="adj2" fmla="val -36952"/>
+              <a:gd name="adj3" fmla="val 16667"/>
+            </a:avLst>
+          </a:prstGeom>
+        </p:spPr>
+        <p:style>
+          <a:lnRef idx="2">
+            <a:schemeClr val="dk1">
+              <a:shade val="50000"/>
+            </a:schemeClr>
+          </a:lnRef>
+          <a:fillRef idx="1">
+            <a:schemeClr val="dk1"/>
+          </a:fillRef>
+          <a:effectRef idx="0">
+            <a:schemeClr val="dk1"/>
+          </a:effectRef>
+          <a:fontRef idx="minor">
+            <a:schemeClr val="lt1"/>
+          </a:fontRef>
+        </p:style>
+        <p:txBody>
+          <a:bodyPr rtlCol="0" anchor="ctr"/>
+          <a:lstStyle/>
+          <a:p>
+            <a:pPr algn="ctr"/>
+            <a:r>
+              <a:rPr kumimoji="1" lang="en-US" altLang="ja-JP" dirty="0"/>
+              <a:t>…TTCG</a:t>
+            </a:r>
+            <a:r>
+              <a:rPr kumimoji="1" lang="en-US" altLang="ja-JP" dirty="0">
+                <a:solidFill>
+                  <a:srgbClr val="FF0000"/>
+                </a:solidFill>
+              </a:rPr>
+              <a:t>T</a:t>
+            </a:r>
+            <a:r>
+              <a:rPr kumimoji="1" lang="en-US" altLang="ja-JP" dirty="0"/>
+              <a:t>AACG…</a:t>
+            </a:r>
+            <a:endParaRPr kumimoji="1" lang="ja-JP" altLang="en-US" dirty="0"/>
+          </a:p>
+        </p:txBody>
+      </p:sp>
     </p:spTree>
     <p:extLst>
       <p:ext uri="{BB962C8B-B14F-4D97-AF65-F5344CB8AC3E}">

</xml_diff>